<commit_message>
change logo in DDD
</commit_message>
<xml_diff>
--- a/docs/Pres/DDD.pptx
+++ b/docs/Pres/DDD.pptx
@@ -243,7 +243,7 @@
           <a:p>
             <a:fld id="{183222BF-A268-4F16-B12B-57325F6D2953}" type="datetimeFigureOut">
               <a:rPr lang="fr-FR" smtClean="0"/>
-              <a:t>08/02/2021</a:t>
+              <a:t>17/01/2022</a:t>
             </a:fld>
             <a:endParaRPr lang="fr-FR"/>
           </a:p>
@@ -413,7 +413,7 @@
           <a:p>
             <a:fld id="{183222BF-A268-4F16-B12B-57325F6D2953}" type="datetimeFigureOut">
               <a:rPr lang="fr-FR" smtClean="0"/>
-              <a:t>08/02/2021</a:t>
+              <a:t>17/01/2022</a:t>
             </a:fld>
             <a:endParaRPr lang="fr-FR"/>
           </a:p>
@@ -593,7 +593,7 @@
           <a:p>
             <a:fld id="{183222BF-A268-4F16-B12B-57325F6D2953}" type="datetimeFigureOut">
               <a:rPr lang="fr-FR" smtClean="0"/>
-              <a:t>08/02/2021</a:t>
+              <a:t>17/01/2022</a:t>
             </a:fld>
             <a:endParaRPr lang="fr-FR"/>
           </a:p>
@@ -763,7 +763,7 @@
           <a:p>
             <a:fld id="{183222BF-A268-4F16-B12B-57325F6D2953}" type="datetimeFigureOut">
               <a:rPr lang="fr-FR" smtClean="0"/>
-              <a:t>08/02/2021</a:t>
+              <a:t>17/01/2022</a:t>
             </a:fld>
             <a:endParaRPr lang="fr-FR"/>
           </a:p>
@@ -1009,7 +1009,7 @@
           <a:p>
             <a:fld id="{183222BF-A268-4F16-B12B-57325F6D2953}" type="datetimeFigureOut">
               <a:rPr lang="fr-FR" smtClean="0"/>
-              <a:t>08/02/2021</a:t>
+              <a:t>17/01/2022</a:t>
             </a:fld>
             <a:endParaRPr lang="fr-FR"/>
           </a:p>
@@ -1241,7 +1241,7 @@
           <a:p>
             <a:fld id="{183222BF-A268-4F16-B12B-57325F6D2953}" type="datetimeFigureOut">
               <a:rPr lang="fr-FR" smtClean="0"/>
-              <a:t>08/02/2021</a:t>
+              <a:t>17/01/2022</a:t>
             </a:fld>
             <a:endParaRPr lang="fr-FR"/>
           </a:p>
@@ -1608,7 +1608,7 @@
           <a:p>
             <a:fld id="{183222BF-A268-4F16-B12B-57325F6D2953}" type="datetimeFigureOut">
               <a:rPr lang="fr-FR" smtClean="0"/>
-              <a:t>08/02/2021</a:t>
+              <a:t>17/01/2022</a:t>
             </a:fld>
             <a:endParaRPr lang="fr-FR"/>
           </a:p>
@@ -1726,7 +1726,7 @@
           <a:p>
             <a:fld id="{183222BF-A268-4F16-B12B-57325F6D2953}" type="datetimeFigureOut">
               <a:rPr lang="fr-FR" smtClean="0"/>
-              <a:t>08/02/2021</a:t>
+              <a:t>17/01/2022</a:t>
             </a:fld>
             <a:endParaRPr lang="fr-FR"/>
           </a:p>
@@ -1821,7 +1821,7 @@
           <a:p>
             <a:fld id="{183222BF-A268-4F16-B12B-57325F6D2953}" type="datetimeFigureOut">
               <a:rPr lang="fr-FR" smtClean="0"/>
-              <a:t>08/02/2021</a:t>
+              <a:t>17/01/2022</a:t>
             </a:fld>
             <a:endParaRPr lang="fr-FR"/>
           </a:p>
@@ -2098,7 +2098,7 @@
           <a:p>
             <a:fld id="{183222BF-A268-4F16-B12B-57325F6D2953}" type="datetimeFigureOut">
               <a:rPr lang="fr-FR" smtClean="0"/>
-              <a:t>08/02/2021</a:t>
+              <a:t>17/01/2022</a:t>
             </a:fld>
             <a:endParaRPr lang="fr-FR"/>
           </a:p>
@@ -2351,7 +2351,7 @@
           <a:p>
             <a:fld id="{183222BF-A268-4F16-B12B-57325F6D2953}" type="datetimeFigureOut">
               <a:rPr lang="fr-FR" smtClean="0"/>
-              <a:t>08/02/2021</a:t>
+              <a:t>17/01/2022</a:t>
             </a:fld>
             <a:endParaRPr lang="fr-FR"/>
           </a:p>
@@ -2564,7 +2564,7 @@
           <a:p>
             <a:fld id="{183222BF-A268-4F16-B12B-57325F6D2953}" type="datetimeFigureOut">
               <a:rPr lang="fr-FR" smtClean="0"/>
-              <a:t>08/02/2021</a:t>
+              <a:t>17/01/2022</a:t>
             </a:fld>
             <a:endParaRPr lang="fr-FR"/>
           </a:p>
@@ -6456,9 +6456,241 @@
           </a:p>
         </p:txBody>
       </p:sp>
+      <p:sp>
+        <p:nvSpPr>
+          <p:cNvPr id="116" name="Rounded Rectangle 115"/>
+          <p:cNvSpPr/>
+          <p:nvPr/>
+        </p:nvSpPr>
+        <p:spPr>
+          <a:xfrm>
+            <a:off x="3740320" y="221861"/>
+            <a:ext cx="1469855" cy="379654"/>
+          </a:xfrm>
+          <a:prstGeom prst="roundRect">
+            <a:avLst/>
+          </a:prstGeom>
+          <a:gradFill flip="none" rotWithShape="1">
+            <a:gsLst>
+              <a:gs pos="0">
+                <a:schemeClr val="accent2">
+                  <a:lumMod val="0"/>
+                  <a:lumOff val="100000"/>
+                </a:schemeClr>
+              </a:gs>
+              <a:gs pos="35000">
+                <a:schemeClr val="accent2">
+                  <a:lumMod val="0"/>
+                  <a:lumOff val="100000"/>
+                </a:schemeClr>
+              </a:gs>
+              <a:gs pos="100000">
+                <a:srgbClr val="FF0000"/>
+              </a:gs>
+            </a:gsLst>
+            <a:path path="circle">
+              <a:fillToRect l="50000" t="-80000" r="50000" b="180000"/>
+            </a:path>
+            <a:tileRect/>
+          </a:gradFill>
+          <a:ln>
+            <a:solidFill>
+              <a:srgbClr val="FF0000"/>
+            </a:solidFill>
+          </a:ln>
+        </p:spPr>
+        <p:style>
+          <a:lnRef idx="2">
+            <a:schemeClr val="accent1">
+              <a:shade val="50000"/>
+            </a:schemeClr>
+          </a:lnRef>
+          <a:fillRef idx="1">
+            <a:schemeClr val="accent1"/>
+          </a:fillRef>
+          <a:effectRef idx="0">
+            <a:schemeClr val="accent1"/>
+          </a:effectRef>
+          <a:fontRef idx="minor">
+            <a:schemeClr val="lt1"/>
+          </a:fontRef>
+        </p:style>
+        <p:txBody>
+          <a:bodyPr rtlCol="0" anchor="ctr"/>
+          <a:lstStyle/>
+          <a:p>
+            <a:pPr algn="ctr"/>
+            <a:r>
+              <a:rPr lang="en-US" sz="1200" dirty="0" smtClean="0">
+                <a:solidFill>
+                  <a:schemeClr val="tx1"/>
+                </a:solidFill>
+              </a:rPr>
+              <a:t>Angular App</a:t>
+            </a:r>
+            <a:endParaRPr lang="en-US" sz="1200" dirty="0">
+              <a:solidFill>
+                <a:schemeClr val="tx1"/>
+              </a:solidFill>
+            </a:endParaRPr>
+          </a:p>
+        </p:txBody>
+      </p:sp>
+      <p:cxnSp>
+        <p:nvCxnSpPr>
+          <p:cNvPr id="117" name="Straight Arrow Connector 116"/>
+          <p:cNvCxnSpPr>
+            <a:stCxn id="8" idx="3"/>
+            <a:endCxn id="6" idx="1"/>
+          </p:cNvCxnSpPr>
+          <p:nvPr/>
+        </p:nvCxnSpPr>
+        <p:spPr>
+          <a:xfrm>
+            <a:off x="1467422" y="3781066"/>
+            <a:ext cx="2381939" cy="546161"/>
+          </a:xfrm>
+          <a:prstGeom prst="straightConnector1">
+            <a:avLst/>
+          </a:prstGeom>
+          <a:ln w="25400">
+            <a:solidFill>
+              <a:schemeClr val="tx1"/>
+            </a:solidFill>
+            <a:tailEnd type="triangle"/>
+          </a:ln>
+        </p:spPr>
+        <p:style>
+          <a:lnRef idx="1">
+            <a:schemeClr val="accent1"/>
+          </a:lnRef>
+          <a:fillRef idx="0">
+            <a:schemeClr val="accent1"/>
+          </a:fillRef>
+          <a:effectRef idx="0">
+            <a:schemeClr val="accent1"/>
+          </a:effectRef>
+          <a:fontRef idx="minor">
+            <a:schemeClr val="tx1"/>
+          </a:fontRef>
+        </p:style>
+      </p:cxnSp>
+      <p:cxnSp>
+        <p:nvCxnSpPr>
+          <p:cNvPr id="133" name="Straight Arrow Connector 132"/>
+          <p:cNvCxnSpPr>
+            <a:stCxn id="5" idx="3"/>
+          </p:cNvCxnSpPr>
+          <p:nvPr/>
+        </p:nvCxnSpPr>
+        <p:spPr>
+          <a:xfrm>
+            <a:off x="7989003" y="2927228"/>
+            <a:ext cx="831147" cy="358897"/>
+          </a:xfrm>
+          <a:prstGeom prst="straightConnector1">
+            <a:avLst/>
+          </a:prstGeom>
+          <a:ln w="25400">
+            <a:solidFill>
+              <a:schemeClr val="tx1"/>
+            </a:solidFill>
+            <a:tailEnd type="triangle"/>
+          </a:ln>
+        </p:spPr>
+        <p:style>
+          <a:lnRef idx="1">
+            <a:schemeClr val="accent1"/>
+          </a:lnRef>
+          <a:fillRef idx="0">
+            <a:schemeClr val="accent1"/>
+          </a:fillRef>
+          <a:effectRef idx="0">
+            <a:schemeClr val="accent1"/>
+          </a:effectRef>
+          <a:fontRef idx="minor">
+            <a:schemeClr val="tx1"/>
+          </a:fontRef>
+        </p:style>
+      </p:cxnSp>
+      <p:cxnSp>
+        <p:nvCxnSpPr>
+          <p:cNvPr id="137" name="Straight Arrow Connector 136"/>
+          <p:cNvCxnSpPr>
+            <a:stCxn id="6" idx="3"/>
+            <a:endCxn id="47" idx="1"/>
+          </p:cNvCxnSpPr>
+          <p:nvPr/>
+        </p:nvCxnSpPr>
+        <p:spPr>
+          <a:xfrm flipV="1">
+            <a:off x="7989003" y="3625624"/>
+            <a:ext cx="781760" cy="701603"/>
+          </a:xfrm>
+          <a:prstGeom prst="straightConnector1">
+            <a:avLst/>
+          </a:prstGeom>
+          <a:ln w="25400">
+            <a:solidFill>
+              <a:schemeClr val="tx1"/>
+            </a:solidFill>
+            <a:tailEnd type="triangle"/>
+          </a:ln>
+        </p:spPr>
+        <p:style>
+          <a:lnRef idx="1">
+            <a:schemeClr val="accent1"/>
+          </a:lnRef>
+          <a:fillRef idx="0">
+            <a:schemeClr val="accent1"/>
+          </a:fillRef>
+          <a:effectRef idx="0">
+            <a:schemeClr val="accent1"/>
+          </a:effectRef>
+          <a:fontRef idx="minor">
+            <a:schemeClr val="tx1"/>
+          </a:fontRef>
+        </p:style>
+      </p:cxnSp>
+      <p:cxnSp>
+        <p:nvCxnSpPr>
+          <p:cNvPr id="141" name="Straight Arrow Connector 140"/>
+          <p:cNvCxnSpPr/>
+          <p:nvPr/>
+        </p:nvCxnSpPr>
+        <p:spPr>
+          <a:xfrm>
+            <a:off x="8608262" y="2119368"/>
+            <a:ext cx="467980" cy="1052968"/>
+          </a:xfrm>
+          <a:prstGeom prst="straightConnector1">
+            <a:avLst/>
+          </a:prstGeom>
+          <a:ln w="25400">
+            <a:solidFill>
+              <a:schemeClr val="tx1"/>
+            </a:solidFill>
+            <a:tailEnd type="triangle"/>
+          </a:ln>
+        </p:spPr>
+        <p:style>
+          <a:lnRef idx="1">
+            <a:schemeClr val="accent1"/>
+          </a:lnRef>
+          <a:fillRef idx="0">
+            <a:schemeClr val="accent1"/>
+          </a:fillRef>
+          <a:effectRef idx="0">
+            <a:schemeClr val="accent1"/>
+          </a:effectRef>
+          <a:fontRef idx="minor">
+            <a:schemeClr val="tx1"/>
+          </a:fontRef>
+        </p:style>
+      </p:cxnSp>
       <p:pic>
         <p:nvPicPr>
-          <p:cNvPr id="115" name="Picture 114"/>
+          <p:cNvPr id="2" name="Picture 1"/>
           <p:cNvPicPr>
             <a:picLocks noChangeAspect="1"/>
           </p:cNvPicPr>
@@ -6478,246 +6710,14 @@
         </p:blipFill>
         <p:spPr>
           <a:xfrm>
-            <a:off x="806524" y="107645"/>
-            <a:ext cx="921252" cy="900013"/>
+            <a:off x="986467" y="0"/>
+            <a:ext cx="888537" cy="888537"/>
           </a:xfrm>
           <a:prstGeom prst="rect">
             <a:avLst/>
           </a:prstGeom>
         </p:spPr>
       </p:pic>
-      <p:sp>
-        <p:nvSpPr>
-          <p:cNvPr id="116" name="Rounded Rectangle 115"/>
-          <p:cNvSpPr/>
-          <p:nvPr/>
-        </p:nvSpPr>
-        <p:spPr>
-          <a:xfrm>
-            <a:off x="3740320" y="221861"/>
-            <a:ext cx="1469855" cy="379654"/>
-          </a:xfrm>
-          <a:prstGeom prst="roundRect">
-            <a:avLst/>
-          </a:prstGeom>
-          <a:gradFill flip="none" rotWithShape="1">
-            <a:gsLst>
-              <a:gs pos="0">
-                <a:schemeClr val="accent2">
-                  <a:lumMod val="0"/>
-                  <a:lumOff val="100000"/>
-                </a:schemeClr>
-              </a:gs>
-              <a:gs pos="35000">
-                <a:schemeClr val="accent2">
-                  <a:lumMod val="0"/>
-                  <a:lumOff val="100000"/>
-                </a:schemeClr>
-              </a:gs>
-              <a:gs pos="100000">
-                <a:srgbClr val="FF0000"/>
-              </a:gs>
-            </a:gsLst>
-            <a:path path="circle">
-              <a:fillToRect l="50000" t="-80000" r="50000" b="180000"/>
-            </a:path>
-            <a:tileRect/>
-          </a:gradFill>
-          <a:ln>
-            <a:solidFill>
-              <a:srgbClr val="FF0000"/>
-            </a:solidFill>
-          </a:ln>
-        </p:spPr>
-        <p:style>
-          <a:lnRef idx="2">
-            <a:schemeClr val="accent1">
-              <a:shade val="50000"/>
-            </a:schemeClr>
-          </a:lnRef>
-          <a:fillRef idx="1">
-            <a:schemeClr val="accent1"/>
-          </a:fillRef>
-          <a:effectRef idx="0">
-            <a:schemeClr val="accent1"/>
-          </a:effectRef>
-          <a:fontRef idx="minor">
-            <a:schemeClr val="lt1"/>
-          </a:fontRef>
-        </p:style>
-        <p:txBody>
-          <a:bodyPr rtlCol="0" anchor="ctr"/>
-          <a:lstStyle/>
-          <a:p>
-            <a:pPr algn="ctr"/>
-            <a:r>
-              <a:rPr lang="en-US" sz="1200" dirty="0" smtClean="0">
-                <a:solidFill>
-                  <a:schemeClr val="tx1"/>
-                </a:solidFill>
-              </a:rPr>
-              <a:t>Angular App</a:t>
-            </a:r>
-            <a:endParaRPr lang="en-US" sz="1200" dirty="0">
-              <a:solidFill>
-                <a:schemeClr val="tx1"/>
-              </a:solidFill>
-            </a:endParaRPr>
-          </a:p>
-        </p:txBody>
-      </p:sp>
-      <p:cxnSp>
-        <p:nvCxnSpPr>
-          <p:cNvPr id="117" name="Straight Arrow Connector 116"/>
-          <p:cNvCxnSpPr>
-            <a:stCxn id="8" idx="3"/>
-            <a:endCxn id="6" idx="1"/>
-          </p:cNvCxnSpPr>
-          <p:nvPr/>
-        </p:nvCxnSpPr>
-        <p:spPr>
-          <a:xfrm>
-            <a:off x="1467422" y="3781066"/>
-            <a:ext cx="2381939" cy="546161"/>
-          </a:xfrm>
-          <a:prstGeom prst="straightConnector1">
-            <a:avLst/>
-          </a:prstGeom>
-          <a:ln w="25400">
-            <a:solidFill>
-              <a:schemeClr val="tx1"/>
-            </a:solidFill>
-            <a:tailEnd type="triangle"/>
-          </a:ln>
-        </p:spPr>
-        <p:style>
-          <a:lnRef idx="1">
-            <a:schemeClr val="accent1"/>
-          </a:lnRef>
-          <a:fillRef idx="0">
-            <a:schemeClr val="accent1"/>
-          </a:fillRef>
-          <a:effectRef idx="0">
-            <a:schemeClr val="accent1"/>
-          </a:effectRef>
-          <a:fontRef idx="minor">
-            <a:schemeClr val="tx1"/>
-          </a:fontRef>
-        </p:style>
-      </p:cxnSp>
-      <p:cxnSp>
-        <p:nvCxnSpPr>
-          <p:cNvPr id="133" name="Straight Arrow Connector 132"/>
-          <p:cNvCxnSpPr>
-            <a:stCxn id="5" idx="3"/>
-          </p:cNvCxnSpPr>
-          <p:nvPr/>
-        </p:nvCxnSpPr>
-        <p:spPr>
-          <a:xfrm>
-            <a:off x="7989003" y="2927228"/>
-            <a:ext cx="831147" cy="358897"/>
-          </a:xfrm>
-          <a:prstGeom prst="straightConnector1">
-            <a:avLst/>
-          </a:prstGeom>
-          <a:ln w="25400">
-            <a:solidFill>
-              <a:schemeClr val="tx1"/>
-            </a:solidFill>
-            <a:tailEnd type="triangle"/>
-          </a:ln>
-        </p:spPr>
-        <p:style>
-          <a:lnRef idx="1">
-            <a:schemeClr val="accent1"/>
-          </a:lnRef>
-          <a:fillRef idx="0">
-            <a:schemeClr val="accent1"/>
-          </a:fillRef>
-          <a:effectRef idx="0">
-            <a:schemeClr val="accent1"/>
-          </a:effectRef>
-          <a:fontRef idx="minor">
-            <a:schemeClr val="tx1"/>
-          </a:fontRef>
-        </p:style>
-      </p:cxnSp>
-      <p:cxnSp>
-        <p:nvCxnSpPr>
-          <p:cNvPr id="137" name="Straight Arrow Connector 136"/>
-          <p:cNvCxnSpPr>
-            <a:stCxn id="6" idx="3"/>
-            <a:endCxn id="47" idx="1"/>
-          </p:cNvCxnSpPr>
-          <p:nvPr/>
-        </p:nvCxnSpPr>
-        <p:spPr>
-          <a:xfrm flipV="1">
-            <a:off x="7989003" y="3625624"/>
-            <a:ext cx="781760" cy="701603"/>
-          </a:xfrm>
-          <a:prstGeom prst="straightConnector1">
-            <a:avLst/>
-          </a:prstGeom>
-          <a:ln w="25400">
-            <a:solidFill>
-              <a:schemeClr val="tx1"/>
-            </a:solidFill>
-            <a:tailEnd type="triangle"/>
-          </a:ln>
-        </p:spPr>
-        <p:style>
-          <a:lnRef idx="1">
-            <a:schemeClr val="accent1"/>
-          </a:lnRef>
-          <a:fillRef idx="0">
-            <a:schemeClr val="accent1"/>
-          </a:fillRef>
-          <a:effectRef idx="0">
-            <a:schemeClr val="accent1"/>
-          </a:effectRef>
-          <a:fontRef idx="minor">
-            <a:schemeClr val="tx1"/>
-          </a:fontRef>
-        </p:style>
-      </p:cxnSp>
-      <p:cxnSp>
-        <p:nvCxnSpPr>
-          <p:cNvPr id="141" name="Straight Arrow Connector 140"/>
-          <p:cNvCxnSpPr/>
-          <p:nvPr/>
-        </p:nvCxnSpPr>
-        <p:spPr>
-          <a:xfrm>
-            <a:off x="8608262" y="2119368"/>
-            <a:ext cx="467980" cy="1052968"/>
-          </a:xfrm>
-          <a:prstGeom prst="straightConnector1">
-            <a:avLst/>
-          </a:prstGeom>
-          <a:ln w="25400">
-            <a:solidFill>
-              <a:schemeClr val="tx1"/>
-            </a:solidFill>
-            <a:tailEnd type="triangle"/>
-          </a:ln>
-        </p:spPr>
-        <p:style>
-          <a:lnRef idx="1">
-            <a:schemeClr val="accent1"/>
-          </a:lnRef>
-          <a:fillRef idx="0">
-            <a:schemeClr val="accent1"/>
-          </a:fillRef>
-          <a:effectRef idx="0">
-            <a:schemeClr val="accent1"/>
-          </a:effectRef>
-          <a:fontRef idx="minor">
-            <a:schemeClr val="tx1"/>
-          </a:fontRef>
-        </p:style>
-      </p:cxnSp>
     </p:spTree>
     <p:extLst>
       <p:ext uri="{BB962C8B-B14F-4D97-AF65-F5344CB8AC3E}">
@@ -6728,6 +6728,13 @@
   <p:clrMapOvr>
     <a:masterClrMapping/>
   </p:clrMapOvr>
+  <p:timing>
+    <p:tnLst>
+      <p:par>
+        <p:cTn id="1" dur="indefinite" restart="never" nodeType="tmRoot"/>
+      </p:par>
+    </p:tnLst>
+  </p:timing>
 </p:sld>
 </file>
 
@@ -6994,120 +7001,29 @@
 
 <file path=customXml/item1.xml><?xml version="1.0" encoding="utf-8"?>
 <?mso-contentType ?>
-<p:Policy xmlns:p="office.server.policy" id="" local="true">
-  <p:Name>IS Document Base</p:Name>
-  <p:Description/>
-  <p:Statement/>
-  <p:PolicyItems>
-    <p:PolicyItem featureId="Microsoft.Office.RecordsManagement.PolicyFeatures.PolicyAudit" staticId="0x0101009EBB870DF3043D4CB532F5954DA5C463|8138272" UniqueId="55d04386-95b1-4092-aa5b-ebb48aa51134">
-      <p:Name>Auditing</p:Name>
-      <p:Description>Audits user actions on documents and list items to the Audit Log.</p:Description>
-      <p:CustomData>
-        <Audit>
-          <Update/>
-          <View/>
-          <CheckInOut/>
-          <MoveCopy/>
-          <DeleteRestore/>
-        </Audit>
-      </p:CustomData>
-    </p:PolicyItem>
-  </p:PolicyItems>
-</p:Policy>
+<FormTemplates xmlns="http://schemas.microsoft.com/sharepoint/v3/contenttype/forms">
+  <Display>DocumentLibraryForm</Display>
+  <Edit>DocumentLibraryForm</Edit>
+  <New>DocumentLibraryForm</New>
+</FormTemplates>
 </file>
 
 <file path=customXml/item2.xml><?xml version="1.0" encoding="utf-8"?>
-<?mso-contentType ?>
-<spe:Receivers xmlns:spe="http://schemas.microsoft.com/sharepoint/events">
-  <Receiver>
-    <Name>Document ID Generator</Name>
-    <Synchronization>Synchronous</Synchronization>
-    <Type>10001</Type>
-    <SequenceNumber>1000</SequenceNumber>
-    <Url/>
-    <Assembly>Microsoft.Office.DocumentManagement, Version=15.0.0.0, Culture=neutral, PublicKeyToken=71e9bce111e9429c</Assembly>
-    <Class>Microsoft.Office.DocumentManagement.Internal.DocIdHandler</Class>
-    <Data/>
-    <Filter/>
-  </Receiver>
-  <Receiver>
-    <Name>Document ID Generator</Name>
-    <Synchronization>Synchronous</Synchronization>
-    <Type>10002</Type>
-    <SequenceNumber>1001</SequenceNumber>
-    <Url/>
-    <Assembly>Microsoft.Office.DocumentManagement, Version=15.0.0.0, Culture=neutral, PublicKeyToken=71e9bce111e9429c</Assembly>
-    <Class>Microsoft.Office.DocumentManagement.Internal.DocIdHandler</Class>
-    <Data/>
-    <Filter/>
-  </Receiver>
-  <Receiver>
-    <Name>Document ID Generator</Name>
-    <Synchronization>Synchronous</Synchronization>
-    <Type>10004</Type>
-    <SequenceNumber>1002</SequenceNumber>
-    <Url/>
-    <Assembly>Microsoft.Office.DocumentManagement, Version=15.0.0.0, Culture=neutral, PublicKeyToken=71e9bce111e9429c</Assembly>
-    <Class>Microsoft.Office.DocumentManagement.Internal.DocIdHandler</Class>
-    <Data/>
-    <Filter/>
-  </Receiver>
-  <Receiver>
-    <Name>Document ID Generator</Name>
-    <Synchronization>Synchronous</Synchronization>
-    <Type>10006</Type>
-    <SequenceNumber>1003</SequenceNumber>
-    <Url/>
-    <Assembly>Microsoft.Office.DocumentManagement, Version=15.0.0.0, Culture=neutral, PublicKeyToken=71e9bce111e9429c</Assembly>
-    <Class>Microsoft.Office.DocumentManagement.Internal.DocIdHandler</Class>
-    <Data/>
-    <Filter/>
-  </Receiver>
-  <Receiver>
-    <Name>Policy Auditing</Name>
-    <Synchronization>Synchronous</Synchronization>
-    <Type>10001</Type>
-    <SequenceNumber>1100</SequenceNumber>
-    <Url/>
-    <Assembly>Microsoft.Office.Policy, Version=15.0.0.0, Culture=neutral, PublicKeyToken=71e9bce111e9429c</Assembly>
-    <Class>Microsoft.Office.RecordsManagement.Internal.AuditHandler</Class>
-    <Data/>
-    <Filter/>
-  </Receiver>
-  <Receiver>
-    <Name>Policy Auditing</Name>
-    <Synchronization>Synchronous</Synchronization>
-    <Type>10002</Type>
-    <SequenceNumber>1101</SequenceNumber>
-    <Url/>
-    <Assembly>Microsoft.Office.Policy, Version=15.0.0.0, Culture=neutral, PublicKeyToken=71e9bce111e9429c</Assembly>
-    <Class>Microsoft.Office.RecordsManagement.Internal.AuditHandler</Class>
-    <Data/>
-    <Filter/>
-  </Receiver>
-  <Receiver>
-    <Name>Policy Auditing</Name>
-    <Synchronization>Synchronous</Synchronization>
-    <Type>10004</Type>
-    <SequenceNumber>1102</SequenceNumber>
-    <Url/>
-    <Assembly>Microsoft.Office.Policy, Version=15.0.0.0, Culture=neutral, PublicKeyToken=71e9bce111e9429c</Assembly>
-    <Class>Microsoft.Office.RecordsManagement.Internal.AuditHandler</Class>
-    <Data/>
-    <Filter/>
-  </Receiver>
-  <Receiver>
-    <Name>Policy Auditing</Name>
-    <Synchronization>Synchronous</Synchronization>
-    <Type>10006</Type>
-    <SequenceNumber>1103</SequenceNumber>
-    <Url/>
-    <Assembly>Microsoft.Office.Policy, Version=15.0.0.0, Culture=neutral, PublicKeyToken=71e9bce111e9429c</Assembly>
-    <Class>Microsoft.Office.RecordsManagement.Internal.AuditHandler</Class>
-    <Data/>
-    <Filter/>
-  </Receiver>
-</spe:Receivers>
+<p:properties xmlns:p="http://schemas.microsoft.com/office/2006/metadata/properties" xmlns:xsi="http://www.w3.org/2001/XMLSchema-instance" xmlns:pc="http://schemas.microsoft.com/office/infopath/2007/PartnerControls">
+  <documentManagement>
+    <TaxKeywordTaxHTField xmlns="61f3af18-e8f1-48d8-875a-37405f44025c">
+      <Terms xmlns="http://schemas.microsoft.com/office/infopath/2007/PartnerControls"/>
+    </TaxKeywordTaxHTField>
+    <TaxCatchAll xmlns="61f3af18-e8f1-48d8-875a-37405f44025c"/>
+    <IconOverlay xmlns="http://schemas.microsoft.com/sharepoint/v4" xsi:nil="true"/>
+    <RelatedItems xmlns="http://schemas.microsoft.com/sharepoint/v3" xsi:nil="true"/>
+    <_dlc_DocId xmlns="61f3af18-e8f1-48d8-875a-37405f44025c">SENPIS-2122580250-372</_dlc_DocId>
+    <_dlc_DocIdUrl xmlns="61f3af18-e8f1-48d8-875a-37405f44025c">
+      <Url>http://nateamwork.labinal.snecma/sep/is/PDMnDM/DM/_layouts/15/DocIdRedir.aspx?ID=SENPIS-2122580250-372</Url>
+      <Description>SENPIS-2122580250-372</Description>
+    </_dlc_DocIdUrl>
+  </documentManagement>
+</p:properties>
 </file>
 
 <file path=customXml/item3.xml><?xml version="1.0" encoding="utf-8"?>
@@ -7316,44 +7232,145 @@
 </file>
 
 <file path=customXml/item4.xml><?xml version="1.0" encoding="utf-8"?>
-<p:properties xmlns:p="http://schemas.microsoft.com/office/2006/metadata/properties" xmlns:xsi="http://www.w3.org/2001/XMLSchema-instance" xmlns:pc="http://schemas.microsoft.com/office/infopath/2007/PartnerControls">
-  <documentManagement>
-    <TaxKeywordTaxHTField xmlns="61f3af18-e8f1-48d8-875a-37405f44025c">
-      <Terms xmlns="http://schemas.microsoft.com/office/infopath/2007/PartnerControls"/>
-    </TaxKeywordTaxHTField>
-    <TaxCatchAll xmlns="61f3af18-e8f1-48d8-875a-37405f44025c"/>
-    <IconOverlay xmlns="http://schemas.microsoft.com/sharepoint/v4" xsi:nil="true"/>
-    <RelatedItems xmlns="http://schemas.microsoft.com/sharepoint/v3" xsi:nil="true"/>
-    <_dlc_DocId xmlns="61f3af18-e8f1-48d8-875a-37405f44025c">SENPIS-2122580250-372</_dlc_DocId>
-    <_dlc_DocIdUrl xmlns="61f3af18-e8f1-48d8-875a-37405f44025c">
-      <Url>http://nateamwork.labinal.snecma/sep/is/PDMnDM/DM/_layouts/15/DocIdRedir.aspx?ID=SENPIS-2122580250-372</Url>
-      <Description>SENPIS-2122580250-372</Description>
-    </_dlc_DocIdUrl>
-  </documentManagement>
-</p:properties>
+<?mso-contentType ?>
+<spe:Receivers xmlns:spe="http://schemas.microsoft.com/sharepoint/events">
+  <Receiver>
+    <Name>Document ID Generator</Name>
+    <Synchronization>Synchronous</Synchronization>
+    <Type>10001</Type>
+    <SequenceNumber>1000</SequenceNumber>
+    <Url/>
+    <Assembly>Microsoft.Office.DocumentManagement, Version=15.0.0.0, Culture=neutral, PublicKeyToken=71e9bce111e9429c</Assembly>
+    <Class>Microsoft.Office.DocumentManagement.Internal.DocIdHandler</Class>
+    <Data/>
+    <Filter/>
+  </Receiver>
+  <Receiver>
+    <Name>Document ID Generator</Name>
+    <Synchronization>Synchronous</Synchronization>
+    <Type>10002</Type>
+    <SequenceNumber>1001</SequenceNumber>
+    <Url/>
+    <Assembly>Microsoft.Office.DocumentManagement, Version=15.0.0.0, Culture=neutral, PublicKeyToken=71e9bce111e9429c</Assembly>
+    <Class>Microsoft.Office.DocumentManagement.Internal.DocIdHandler</Class>
+    <Data/>
+    <Filter/>
+  </Receiver>
+  <Receiver>
+    <Name>Document ID Generator</Name>
+    <Synchronization>Synchronous</Synchronization>
+    <Type>10004</Type>
+    <SequenceNumber>1002</SequenceNumber>
+    <Url/>
+    <Assembly>Microsoft.Office.DocumentManagement, Version=15.0.0.0, Culture=neutral, PublicKeyToken=71e9bce111e9429c</Assembly>
+    <Class>Microsoft.Office.DocumentManagement.Internal.DocIdHandler</Class>
+    <Data/>
+    <Filter/>
+  </Receiver>
+  <Receiver>
+    <Name>Document ID Generator</Name>
+    <Synchronization>Synchronous</Synchronization>
+    <Type>10006</Type>
+    <SequenceNumber>1003</SequenceNumber>
+    <Url/>
+    <Assembly>Microsoft.Office.DocumentManagement, Version=15.0.0.0, Culture=neutral, PublicKeyToken=71e9bce111e9429c</Assembly>
+    <Class>Microsoft.Office.DocumentManagement.Internal.DocIdHandler</Class>
+    <Data/>
+    <Filter/>
+  </Receiver>
+  <Receiver>
+    <Name>Policy Auditing</Name>
+    <Synchronization>Synchronous</Synchronization>
+    <Type>10001</Type>
+    <SequenceNumber>1100</SequenceNumber>
+    <Url/>
+    <Assembly>Microsoft.Office.Policy, Version=15.0.0.0, Culture=neutral, PublicKeyToken=71e9bce111e9429c</Assembly>
+    <Class>Microsoft.Office.RecordsManagement.Internal.AuditHandler</Class>
+    <Data/>
+    <Filter/>
+  </Receiver>
+  <Receiver>
+    <Name>Policy Auditing</Name>
+    <Synchronization>Synchronous</Synchronization>
+    <Type>10002</Type>
+    <SequenceNumber>1101</SequenceNumber>
+    <Url/>
+    <Assembly>Microsoft.Office.Policy, Version=15.0.0.0, Culture=neutral, PublicKeyToken=71e9bce111e9429c</Assembly>
+    <Class>Microsoft.Office.RecordsManagement.Internal.AuditHandler</Class>
+    <Data/>
+    <Filter/>
+  </Receiver>
+  <Receiver>
+    <Name>Policy Auditing</Name>
+    <Synchronization>Synchronous</Synchronization>
+    <Type>10004</Type>
+    <SequenceNumber>1102</SequenceNumber>
+    <Url/>
+    <Assembly>Microsoft.Office.Policy, Version=15.0.0.0, Culture=neutral, PublicKeyToken=71e9bce111e9429c</Assembly>
+    <Class>Microsoft.Office.RecordsManagement.Internal.AuditHandler</Class>
+    <Data/>
+    <Filter/>
+  </Receiver>
+  <Receiver>
+    <Name>Policy Auditing</Name>
+    <Synchronization>Synchronous</Synchronization>
+    <Type>10006</Type>
+    <SequenceNumber>1103</SequenceNumber>
+    <Url/>
+    <Assembly>Microsoft.Office.Policy, Version=15.0.0.0, Culture=neutral, PublicKeyToken=71e9bce111e9429c</Assembly>
+    <Class>Microsoft.Office.RecordsManagement.Internal.AuditHandler</Class>
+    <Data/>
+    <Filter/>
+  </Receiver>
+</spe:Receivers>
 </file>
 
 <file path=customXml/item5.xml><?xml version="1.0" encoding="utf-8"?>
 <?mso-contentType ?>
-<FormTemplates xmlns="http://schemas.microsoft.com/sharepoint/v3/contenttype/forms">
-  <Display>DocumentLibraryForm</Display>
-  <Edit>DocumentLibraryForm</Edit>
-  <New>DocumentLibraryForm</New>
-</FormTemplates>
+<p:Policy xmlns:p="office.server.policy" id="" local="true">
+  <p:Name>IS Document Base</p:Name>
+  <p:Description/>
+  <p:Statement/>
+  <p:PolicyItems>
+    <p:PolicyItem featureId="Microsoft.Office.RecordsManagement.PolicyFeatures.PolicyAudit" staticId="0x0101009EBB870DF3043D4CB532F5954DA5C463|8138272" UniqueId="55d04386-95b1-4092-aa5b-ebb48aa51134">
+      <p:Name>Auditing</p:Name>
+      <p:Description>Audits user actions on documents and list items to the Audit Log.</p:Description>
+      <p:CustomData>
+        <Audit>
+          <Update/>
+          <View/>
+          <CheckInOut/>
+          <MoveCopy/>
+          <DeleteRestore/>
+        </Audit>
+      </p:CustomData>
+    </p:PolicyItem>
+  </p:PolicyItems>
+</p:Policy>
 </file>
 
 <file path=customXml/itemProps1.xml><?xml version="1.0" encoding="utf-8"?>
-<ds:datastoreItem xmlns:ds="http://schemas.openxmlformats.org/officeDocument/2006/customXml" ds:itemID="{B241ED19-5F23-403C-90F6-6FC308EB2676}">
+<ds:datastoreItem xmlns:ds="http://schemas.openxmlformats.org/officeDocument/2006/customXml" ds:itemID="{74589AD7-7C1D-45EF-BC19-CF23E2557F82}">
   <ds:schemaRefs>
-    <ds:schemaRef ds:uri="office.server.policy"/>
+    <ds:schemaRef ds:uri="http://schemas.microsoft.com/sharepoint/v3/contenttype/forms"/>
   </ds:schemaRefs>
 </ds:datastoreItem>
 </file>
 
 <file path=customXml/itemProps2.xml><?xml version="1.0" encoding="utf-8"?>
-<ds:datastoreItem xmlns:ds="http://schemas.openxmlformats.org/officeDocument/2006/customXml" ds:itemID="{47FE5EF4-4A21-47AD-801B-7E6DBEC3AD3E}">
+<ds:datastoreItem xmlns:ds="http://schemas.openxmlformats.org/officeDocument/2006/customXml" ds:itemID="{69DB44C1-41E4-4EF4-88FC-5743B967998D}">
   <ds:schemaRefs>
-    <ds:schemaRef ds:uri="http://schemas.microsoft.com/sharepoint/events"/>
+    <ds:schemaRef ds:uri="http://schemas.microsoft.com/office/2006/metadata/properties"/>
+    <ds:schemaRef ds:uri="http://purl.org/dc/terms/"/>
+    <ds:schemaRef ds:uri="http://schemas.microsoft.com/sharepoint/v3"/>
+    <ds:schemaRef ds:uri="http://schemas.microsoft.com/office/2006/documentManagement/types"/>
+    <ds:schemaRef ds:uri="61f3af18-e8f1-48d8-875a-37405f44025c"/>
+    <ds:schemaRef ds:uri="http://schemas.openxmlformats.org/package/2006/metadata/core-properties"/>
+    <ds:schemaRef ds:uri="http://purl.org/dc/elements/1.1/"/>
+    <ds:schemaRef ds:uri="http://schemas.microsoft.com/office/infopath/2007/PartnerControls"/>
+    <ds:schemaRef ds:uri="http://schemas.microsoft.com/sharepoint/v4"/>
+    <ds:schemaRef ds:uri="http://www.w3.org/XML/1998/namespace"/>
+    <ds:schemaRef ds:uri="http://purl.org/dc/dcmitype/"/>
   </ds:schemaRefs>
 </ds:datastoreItem>
 </file>
@@ -7379,27 +7396,17 @@
 </file>
 
 <file path=customXml/itemProps4.xml><?xml version="1.0" encoding="utf-8"?>
-<ds:datastoreItem xmlns:ds="http://schemas.openxmlformats.org/officeDocument/2006/customXml" ds:itemID="{69DB44C1-41E4-4EF4-88FC-5743B967998D}">
+<ds:datastoreItem xmlns:ds="http://schemas.openxmlformats.org/officeDocument/2006/customXml" ds:itemID="{47FE5EF4-4A21-47AD-801B-7E6DBEC3AD3E}">
   <ds:schemaRefs>
-    <ds:schemaRef ds:uri="http://schemas.microsoft.com/office/2006/metadata/properties"/>
-    <ds:schemaRef ds:uri="http://purl.org/dc/terms/"/>
-    <ds:schemaRef ds:uri="http://schemas.microsoft.com/sharepoint/v3"/>
-    <ds:schemaRef ds:uri="http://schemas.microsoft.com/office/2006/documentManagement/types"/>
-    <ds:schemaRef ds:uri="61f3af18-e8f1-48d8-875a-37405f44025c"/>
-    <ds:schemaRef ds:uri="http://schemas.openxmlformats.org/package/2006/metadata/core-properties"/>
-    <ds:schemaRef ds:uri="http://purl.org/dc/elements/1.1/"/>
-    <ds:schemaRef ds:uri="http://schemas.microsoft.com/office/infopath/2007/PartnerControls"/>
-    <ds:schemaRef ds:uri="http://schemas.microsoft.com/sharepoint/v4"/>
-    <ds:schemaRef ds:uri="http://www.w3.org/XML/1998/namespace"/>
-    <ds:schemaRef ds:uri="http://purl.org/dc/dcmitype/"/>
+    <ds:schemaRef ds:uri="http://schemas.microsoft.com/sharepoint/events"/>
   </ds:schemaRefs>
 </ds:datastoreItem>
 </file>
 
 <file path=customXml/itemProps5.xml><?xml version="1.0" encoding="utf-8"?>
-<ds:datastoreItem xmlns:ds="http://schemas.openxmlformats.org/officeDocument/2006/customXml" ds:itemID="{74589AD7-7C1D-45EF-BC19-CF23E2557F82}">
+<ds:datastoreItem xmlns:ds="http://schemas.openxmlformats.org/officeDocument/2006/customXml" ds:itemID="{B241ED19-5F23-403C-90F6-6FC308EB2676}">
   <ds:schemaRefs>
-    <ds:schemaRef ds:uri="http://schemas.microsoft.com/sharepoint/v3/contenttype/forms"/>
+    <ds:schemaRef ds:uri="office.server.policy"/>
   </ds:schemaRefs>
 </ds:datastoreItem>
 </file>
</xml_diff>